<commit_message>
Add Results to the Presentation
Add Results to the Presentation
</commit_message>
<xml_diff>
--- a/מצגת סיכום - דוח אבטחת סיסמאות.pptx
+++ b/מצגת סיכום - דוח אבטחת סיסמאות.pptx
@@ -5,16 +5,21 @@
     <p:sldMasterId id="2147483648" r:id="rId4"/>
   </p:sldMasterIdLst>
   <p:notesMasterIdLst>
-    <p:notesMasterId r:id="rId9"/>
+    <p:notesMasterId r:id="rId14"/>
   </p:notesMasterIdLst>
   <p:handoutMasterIdLst>
-    <p:handoutMasterId r:id="rId10"/>
+    <p:handoutMasterId r:id="rId15"/>
   </p:handoutMasterIdLst>
   <p:sldIdLst>
     <p:sldId id="256" r:id="rId5"/>
     <p:sldId id="258" r:id="rId6"/>
     <p:sldId id="286" r:id="rId7"/>
     <p:sldId id="287" r:id="rId8"/>
+    <p:sldId id="288" r:id="rId9"/>
+    <p:sldId id="289" r:id="rId10"/>
+    <p:sldId id="290" r:id="rId11"/>
+    <p:sldId id="291" r:id="rId12"/>
+    <p:sldId id="292" r:id="rId13"/>
   </p:sldIdLst>
   <p:sldSz cx="12192000" cy="6858000"/>
   <p:notesSz cx="6858000" cy="9144000"/>
@@ -124,6 +129,214 @@
 </p:presentation>
 </file>
 
+<file path=ppt/revisionInfo.xml><?xml version="1.0" encoding="utf-8"?>
+<p1510:revInfo xmlns:a="http://schemas.openxmlformats.org/drawingml/2006/main" xmlns:r="http://schemas.openxmlformats.org/officeDocument/2006/relationships" xmlns:p1510="http://schemas.microsoft.com/office/powerpoint/2015/10/main">
+  <p1510:revLst>
+    <p1510:client id="{5B54D4B7-718D-432D-B8CC-047A74D539D1}" v="14" dt="2025-12-27T12:39:04.899"/>
+  </p1510:revLst>
+</p1510:revInfo>
+</file>
+
+<file path=ppt/changesInfos/changesInfo1.xml><?xml version="1.0" encoding="utf-8"?>
+<pc:chgInfo xmlns:a="http://schemas.openxmlformats.org/drawingml/2006/main" xmlns:r="http://schemas.openxmlformats.org/officeDocument/2006/relationships" xmlns:ac="http://schemas.microsoft.com/office/drawing/2013/main/command" xmlns:pc="http://schemas.microsoft.com/office/powerpoint/2013/main/command">
+  <pc:docChgLst>
+    <pc:chgData name="Lior Zemah" userId="e977be7c-d7b1-4c01-95de-387adb527da0" providerId="ADAL" clId="{99D818E4-AD44-463A-87C4-9DFB5B0A464A}"/>
+    <pc:docChg chg="undo custSel addSld delSld modSld">
+      <pc:chgData name="Lior Zemah" userId="e977be7c-d7b1-4c01-95de-387adb527da0" providerId="ADAL" clId="{99D818E4-AD44-463A-87C4-9DFB5B0A464A}" dt="2025-12-27T12:39:34.962" v="1030" actId="20577"/>
+      <pc:docMkLst>
+        <pc:docMk/>
+      </pc:docMkLst>
+      <pc:sldChg chg="addSp modSp new mod">
+        <pc:chgData name="Lior Zemah" userId="e977be7c-d7b1-4c01-95de-387adb527da0" providerId="ADAL" clId="{99D818E4-AD44-463A-87C4-9DFB5B0A464A}" dt="2025-12-27T12:38:43.695" v="1002" actId="5793"/>
+        <pc:sldMkLst>
+          <pc:docMk/>
+          <pc:sldMk cId="3316315987" sldId="288"/>
+        </pc:sldMkLst>
+        <pc:spChg chg="mod">
+          <ac:chgData name="Lior Zemah" userId="e977be7c-d7b1-4c01-95de-387adb527da0" providerId="ADAL" clId="{99D818E4-AD44-463A-87C4-9DFB5B0A464A}" dt="2025-12-27T12:28:06.598" v="631" actId="20577"/>
+          <ac:spMkLst>
+            <pc:docMk/>
+            <pc:sldMk cId="3316315987" sldId="288"/>
+            <ac:spMk id="2" creationId="{6B511EA8-C07B-E888-46D9-FBB45FD19E73}"/>
+          </ac:spMkLst>
+        </pc:spChg>
+        <pc:spChg chg="mod">
+          <ac:chgData name="Lior Zemah" userId="e977be7c-d7b1-4c01-95de-387adb527da0" providerId="ADAL" clId="{99D818E4-AD44-463A-87C4-9DFB5B0A464A}" dt="2025-12-27T12:38:43.695" v="1002" actId="5793"/>
+          <ac:spMkLst>
+            <pc:docMk/>
+            <pc:sldMk cId="3316315987" sldId="288"/>
+            <ac:spMk id="3" creationId="{CF4371ED-7478-DB81-15EE-102E3421C05D}"/>
+          </ac:spMkLst>
+        </pc:spChg>
+        <pc:picChg chg="add mod">
+          <ac:chgData name="Lior Zemah" userId="e977be7c-d7b1-4c01-95de-387adb527da0" providerId="ADAL" clId="{99D818E4-AD44-463A-87C4-9DFB5B0A464A}" dt="2025-12-27T12:22:19.430" v="158" actId="1076"/>
+          <ac:picMkLst>
+            <pc:docMk/>
+            <pc:sldMk cId="3316315987" sldId="288"/>
+            <ac:picMk id="6" creationId="{7D9874F8-B34F-70B3-060A-FA5254496140}"/>
+          </ac:picMkLst>
+        </pc:picChg>
+      </pc:sldChg>
+      <pc:sldChg chg="addSp delSp modSp add mod">
+        <pc:chgData name="Lior Zemah" userId="e977be7c-d7b1-4c01-95de-387adb527da0" providerId="ADAL" clId="{99D818E4-AD44-463A-87C4-9DFB5B0A464A}" dt="2025-12-27T12:28:45.108" v="664" actId="14100"/>
+        <pc:sldMkLst>
+          <pc:docMk/>
+          <pc:sldMk cId="2976962570" sldId="289"/>
+        </pc:sldMkLst>
+        <pc:spChg chg="mod">
+          <ac:chgData name="Lior Zemah" userId="e977be7c-d7b1-4c01-95de-387adb527da0" providerId="ADAL" clId="{99D818E4-AD44-463A-87C4-9DFB5B0A464A}" dt="2025-12-27T12:28:21.556" v="661" actId="20577"/>
+          <ac:spMkLst>
+            <pc:docMk/>
+            <pc:sldMk cId="2976962570" sldId="289"/>
+            <ac:spMk id="2" creationId="{17EF1B8E-73E3-0FD6-07C7-DE091B7B8AFE}"/>
+          </ac:spMkLst>
+        </pc:spChg>
+        <pc:spChg chg="mod">
+          <ac:chgData name="Lior Zemah" userId="e977be7c-d7b1-4c01-95de-387adb527da0" providerId="ADAL" clId="{99D818E4-AD44-463A-87C4-9DFB5B0A464A}" dt="2025-12-27T12:27:30.201" v="582" actId="20577"/>
+          <ac:spMkLst>
+            <pc:docMk/>
+            <pc:sldMk cId="2976962570" sldId="289"/>
+            <ac:spMk id="3" creationId="{1CCAD9E0-CCB4-A980-0BDA-6771EFE7F37A}"/>
+          </ac:spMkLst>
+        </pc:spChg>
+        <pc:picChg chg="del">
+          <ac:chgData name="Lior Zemah" userId="e977be7c-d7b1-4c01-95de-387adb527da0" providerId="ADAL" clId="{99D818E4-AD44-463A-87C4-9DFB5B0A464A}" dt="2025-12-27T12:23:49.255" v="161" actId="478"/>
+          <ac:picMkLst>
+            <pc:docMk/>
+            <pc:sldMk cId="2976962570" sldId="289"/>
+            <ac:picMk id="6" creationId="{18715601-21E6-13DE-7DB4-C3AB816878DA}"/>
+          </ac:picMkLst>
+        </pc:picChg>
+        <pc:picChg chg="add mod">
+          <ac:chgData name="Lior Zemah" userId="e977be7c-d7b1-4c01-95de-387adb527da0" providerId="ADAL" clId="{99D818E4-AD44-463A-87C4-9DFB5B0A464A}" dt="2025-12-27T12:28:45.108" v="664" actId="14100"/>
+          <ac:picMkLst>
+            <pc:docMk/>
+            <pc:sldMk cId="2976962570" sldId="289"/>
+            <ac:picMk id="7" creationId="{1016E888-F564-36DC-3F81-21D16A9427D9}"/>
+          </ac:picMkLst>
+        </pc:picChg>
+      </pc:sldChg>
+      <pc:sldChg chg="addSp delSp modSp add mod">
+        <pc:chgData name="Lior Zemah" userId="e977be7c-d7b1-4c01-95de-387adb527da0" providerId="ADAL" clId="{99D818E4-AD44-463A-87C4-9DFB5B0A464A}" dt="2025-12-27T12:30:36.913" v="698" actId="14100"/>
+        <pc:sldMkLst>
+          <pc:docMk/>
+          <pc:sldMk cId="330860302" sldId="290"/>
+        </pc:sldMkLst>
+        <pc:spChg chg="mod">
+          <ac:chgData name="Lior Zemah" userId="e977be7c-d7b1-4c01-95de-387adb527da0" providerId="ADAL" clId="{99D818E4-AD44-463A-87C4-9DFB5B0A464A}" dt="2025-12-27T12:29:06.395" v="691" actId="20577"/>
+          <ac:spMkLst>
+            <pc:docMk/>
+            <pc:sldMk cId="330860302" sldId="290"/>
+            <ac:spMk id="2" creationId="{89694BD3-02E7-0BBD-A48D-5D7F6125FC56}"/>
+          </ac:spMkLst>
+        </pc:spChg>
+        <pc:spChg chg="mod">
+          <ac:chgData name="Lior Zemah" userId="e977be7c-d7b1-4c01-95de-387adb527da0" providerId="ADAL" clId="{99D818E4-AD44-463A-87C4-9DFB5B0A464A}" dt="2025-12-27T12:29:32.585" v="695" actId="20577"/>
+          <ac:spMkLst>
+            <pc:docMk/>
+            <pc:sldMk cId="330860302" sldId="290"/>
+            <ac:spMk id="3" creationId="{D2C7D23C-2C13-E871-1C10-1CBB0ED1E74B}"/>
+          </ac:spMkLst>
+        </pc:spChg>
+        <pc:picChg chg="add mod">
+          <ac:chgData name="Lior Zemah" userId="e977be7c-d7b1-4c01-95de-387adb527da0" providerId="ADAL" clId="{99D818E4-AD44-463A-87C4-9DFB5B0A464A}" dt="2025-12-27T12:30:36.913" v="698" actId="14100"/>
+          <ac:picMkLst>
+            <pc:docMk/>
+            <pc:sldMk cId="330860302" sldId="290"/>
+            <ac:picMk id="6" creationId="{308B3D73-64EE-EAA8-A547-C69630B67E9B}"/>
+          </ac:picMkLst>
+        </pc:picChg>
+        <pc:picChg chg="del">
+          <ac:chgData name="Lior Zemah" userId="e977be7c-d7b1-4c01-95de-387adb527da0" providerId="ADAL" clId="{99D818E4-AD44-463A-87C4-9DFB5B0A464A}" dt="2025-12-27T12:29:24.639" v="692" actId="478"/>
+          <ac:picMkLst>
+            <pc:docMk/>
+            <pc:sldMk cId="330860302" sldId="290"/>
+            <ac:picMk id="7" creationId="{3591401E-796F-ACF5-790C-9A9376C02AAF}"/>
+          </ac:picMkLst>
+        </pc:picChg>
+      </pc:sldChg>
+      <pc:sldChg chg="addSp delSp modSp add mod">
+        <pc:chgData name="Lior Zemah" userId="e977be7c-d7b1-4c01-95de-387adb527da0" providerId="ADAL" clId="{99D818E4-AD44-463A-87C4-9DFB5B0A464A}" dt="2025-12-27T12:39:25.601" v="1029" actId="20577"/>
+        <pc:sldMkLst>
+          <pc:docMk/>
+          <pc:sldMk cId="3632765082" sldId="291"/>
+        </pc:sldMkLst>
+        <pc:spChg chg="mod">
+          <ac:chgData name="Lior Zemah" userId="e977be7c-d7b1-4c01-95de-387adb527da0" providerId="ADAL" clId="{99D818E4-AD44-463A-87C4-9DFB5B0A464A}" dt="2025-12-27T12:33:28.905" v="737" actId="14100"/>
+          <ac:spMkLst>
+            <pc:docMk/>
+            <pc:sldMk cId="3632765082" sldId="291"/>
+            <ac:spMk id="2" creationId="{1F818B17-BB9C-9788-F09A-14413054C036}"/>
+          </ac:spMkLst>
+        </pc:spChg>
+        <pc:spChg chg="mod">
+          <ac:chgData name="Lior Zemah" userId="e977be7c-d7b1-4c01-95de-387adb527da0" providerId="ADAL" clId="{99D818E4-AD44-463A-87C4-9DFB5B0A464A}" dt="2025-12-27T12:39:25.601" v="1029" actId="20577"/>
+          <ac:spMkLst>
+            <pc:docMk/>
+            <pc:sldMk cId="3632765082" sldId="291"/>
+            <ac:spMk id="3" creationId="{B7FA9393-76A2-0DD2-0601-E79E895E3D39}"/>
+          </ac:spMkLst>
+        </pc:spChg>
+        <pc:picChg chg="del">
+          <ac:chgData name="Lior Zemah" userId="e977be7c-d7b1-4c01-95de-387adb527da0" providerId="ADAL" clId="{99D818E4-AD44-463A-87C4-9DFB5B0A464A}" dt="2025-12-27T12:31:21.541" v="723" actId="478"/>
+          <ac:picMkLst>
+            <pc:docMk/>
+            <pc:sldMk cId="3632765082" sldId="291"/>
+            <ac:picMk id="6" creationId="{336580DC-995A-3F16-1A02-F492379C7353}"/>
+          </ac:picMkLst>
+        </pc:picChg>
+        <pc:picChg chg="add mod">
+          <ac:chgData name="Lior Zemah" userId="e977be7c-d7b1-4c01-95de-387adb527da0" providerId="ADAL" clId="{99D818E4-AD44-463A-87C4-9DFB5B0A464A}" dt="2025-12-27T12:33:32.857" v="739" actId="1076"/>
+          <ac:picMkLst>
+            <pc:docMk/>
+            <pc:sldMk cId="3632765082" sldId="291"/>
+            <ac:picMk id="7" creationId="{E02EAA48-D1F8-856A-6346-8D3F89232719}"/>
+          </ac:picMkLst>
+        </pc:picChg>
+      </pc:sldChg>
+      <pc:sldChg chg="new del">
+        <pc:chgData name="Lior Zemah" userId="e977be7c-d7b1-4c01-95de-387adb527da0" providerId="ADAL" clId="{99D818E4-AD44-463A-87C4-9DFB5B0A464A}" dt="2025-12-27T12:34:09.804" v="741" actId="47"/>
+        <pc:sldMkLst>
+          <pc:docMk/>
+          <pc:sldMk cId="155843413" sldId="292"/>
+        </pc:sldMkLst>
+      </pc:sldChg>
+      <pc:sldChg chg="delSp modSp add mod">
+        <pc:chgData name="Lior Zemah" userId="e977be7c-d7b1-4c01-95de-387adb527da0" providerId="ADAL" clId="{99D818E4-AD44-463A-87C4-9DFB5B0A464A}" dt="2025-12-27T12:39:34.962" v="1030" actId="20577"/>
+        <pc:sldMkLst>
+          <pc:docMk/>
+          <pc:sldMk cId="1475473579" sldId="292"/>
+        </pc:sldMkLst>
+        <pc:spChg chg="mod">
+          <ac:chgData name="Lior Zemah" userId="e977be7c-d7b1-4c01-95de-387adb527da0" providerId="ADAL" clId="{99D818E4-AD44-463A-87C4-9DFB5B0A464A}" dt="2025-12-27T12:38:13.711" v="992" actId="14100"/>
+          <ac:spMkLst>
+            <pc:docMk/>
+            <pc:sldMk cId="1475473579" sldId="292"/>
+            <ac:spMk id="2" creationId="{BBD333AB-8378-75FA-C792-C3A442AA74A4}"/>
+          </ac:spMkLst>
+        </pc:spChg>
+        <pc:spChg chg="mod">
+          <ac:chgData name="Lior Zemah" userId="e977be7c-d7b1-4c01-95de-387adb527da0" providerId="ADAL" clId="{99D818E4-AD44-463A-87C4-9DFB5B0A464A}" dt="2025-12-27T12:39:34.962" v="1030" actId="20577"/>
+          <ac:spMkLst>
+            <pc:docMk/>
+            <pc:sldMk cId="1475473579" sldId="292"/>
+            <ac:spMk id="3" creationId="{02FF29F5-09C9-9E57-31A4-1CDD0C89EBB1}"/>
+          </ac:spMkLst>
+        </pc:spChg>
+        <pc:picChg chg="del">
+          <ac:chgData name="Lior Zemah" userId="e977be7c-d7b1-4c01-95de-387adb527da0" providerId="ADAL" clId="{99D818E4-AD44-463A-87C4-9DFB5B0A464A}" dt="2025-12-27T12:34:26.214" v="759" actId="478"/>
+          <ac:picMkLst>
+            <pc:docMk/>
+            <pc:sldMk cId="1475473579" sldId="292"/>
+            <ac:picMk id="7" creationId="{BF21C2B4-F48C-3720-13AE-CD7B1A4B0DA5}"/>
+          </ac:picMkLst>
+        </pc:picChg>
+      </pc:sldChg>
+    </pc:docChg>
+  </pc:docChgLst>
+</pc:chgInfo>
+</file>
+
 <file path=ppt/handoutMasters/handoutMaster1.xml><?xml version="1.0" encoding="utf-8"?>
 <p:handoutMaster xmlns:a="http://schemas.openxmlformats.org/drawingml/2006/main" xmlns:r="http://schemas.openxmlformats.org/officeDocument/2006/relationships" xmlns:p="http://schemas.openxmlformats.org/presentationml/2006/main">
   <p:cSld>
@@ -218,7 +431,7 @@
           <a:p>
             <a:fld id="{B56F32FC-4BD9-442A-A8C6-51598C909FE3}" type="datetimeFigureOut">
               <a:rPr lang="en-US" smtClean="0"/>
-              <a:t>12/23/2025</a:t>
+              <a:t>12/27/2025</a:t>
             </a:fld>
             <a:endParaRPr lang="en-US" dirty="0"/>
           </a:p>
@@ -395,7 +608,7 @@
           <a:p>
             <a:fld id="{056371FA-A98D-41E8-93F4-09945841298A}" type="datetimeFigureOut">
               <a:rPr lang="en-US" smtClean="0"/>
-              <a:t>12/23/2025</a:t>
+              <a:t>12/27/2025</a:t>
             </a:fld>
             <a:endParaRPr lang="en-US" dirty="0"/>
           </a:p>
@@ -1037,6 +1250,198 @@
     <p:extLst>
       <p:ext uri="{BB962C8B-B14F-4D97-AF65-F5344CB8AC3E}">
         <p14:creationId xmlns:p14="http://schemas.microsoft.com/office/powerpoint/2010/main" val="1371592472"/>
+      </p:ext>
+    </p:extLst>
+  </p:cSld>
+  <p:clrMapOvr>
+    <a:masterClrMapping/>
+  </p:clrMapOvr>
+</p:notes>
+</file>
+
+<file path=ppt/notesSlides/notesSlide5.xml><?xml version="1.0" encoding="utf-8"?>
+<p:notes xmlns:a="http://schemas.openxmlformats.org/drawingml/2006/main" xmlns:r="http://schemas.openxmlformats.org/officeDocument/2006/relationships" xmlns:p="http://schemas.openxmlformats.org/presentationml/2006/main">
+  <p:cSld>
+    <p:spTree>
+      <p:nvGrpSpPr>
+        <p:cNvPr id="1" name=""/>
+        <p:cNvGrpSpPr/>
+        <p:nvPr/>
+      </p:nvGrpSpPr>
+      <p:grpSpPr>
+        <a:xfrm>
+          <a:off x="0" y="0"/>
+          <a:ext cx="0" cy="0"/>
+          <a:chOff x="0" y="0"/>
+          <a:chExt cx="0" cy="0"/>
+        </a:xfrm>
+      </p:grpSpPr>
+      <p:sp>
+        <p:nvSpPr>
+          <p:cNvPr id="2" name="Slide Image Placeholder 1"/>
+          <p:cNvSpPr>
+            <a:spLocks noGrp="1" noRot="1" noChangeAspect="1"/>
+          </p:cNvSpPr>
+          <p:nvPr>
+            <p:ph type="sldImg"/>
+          </p:nvPr>
+        </p:nvSpPr>
+        <p:spPr/>
+      </p:sp>
+      <p:sp>
+        <p:nvSpPr>
+          <p:cNvPr id="3" name="Notes Placeholder 2"/>
+          <p:cNvSpPr>
+            <a:spLocks noGrp="1"/>
+          </p:cNvSpPr>
+          <p:nvPr>
+            <p:ph type="body" idx="1"/>
+          </p:nvPr>
+        </p:nvSpPr>
+        <p:spPr/>
+        <p:txBody>
+          <a:bodyPr/>
+          <a:lstStyle/>
+          <a:p>
+            <a:endParaRPr lang="en-IL" dirty="0"/>
+          </a:p>
+        </p:txBody>
+      </p:sp>
+      <p:sp>
+        <p:nvSpPr>
+          <p:cNvPr id="4" name="Slide Number Placeholder 3"/>
+          <p:cNvSpPr>
+            <a:spLocks noGrp="1"/>
+          </p:cNvSpPr>
+          <p:nvPr>
+            <p:ph type="sldNum" sz="quarter" idx="5"/>
+          </p:nvPr>
+        </p:nvSpPr>
+        <p:spPr/>
+        <p:txBody>
+          <a:bodyPr/>
+          <a:lstStyle/>
+          <a:p>
+            <a:fld id="{22289C57-55D7-40A4-A101-E74FAC7A092B}" type="slidenum">
+              <a:rPr lang="en-US" smtClean="0"/>
+              <a:t>8</a:t>
+            </a:fld>
+            <a:endParaRPr lang="en-US" dirty="0"/>
+          </a:p>
+        </p:txBody>
+      </p:sp>
+    </p:spTree>
+    <p:extLst>
+      <p:ext uri="{BB962C8B-B14F-4D97-AF65-F5344CB8AC3E}">
+        <p14:creationId xmlns:p14="http://schemas.microsoft.com/office/powerpoint/2010/main" val="2453035557"/>
+      </p:ext>
+    </p:extLst>
+  </p:cSld>
+  <p:clrMapOvr>
+    <a:masterClrMapping/>
+  </p:clrMapOvr>
+</p:notes>
+</file>
+
+<file path=ppt/notesSlides/notesSlide6.xml><?xml version="1.0" encoding="utf-8"?>
+<p:notes xmlns:a="http://schemas.openxmlformats.org/drawingml/2006/main" xmlns:r="http://schemas.openxmlformats.org/officeDocument/2006/relationships" xmlns:p="http://schemas.openxmlformats.org/presentationml/2006/main">
+  <p:cSld>
+    <p:spTree>
+      <p:nvGrpSpPr>
+        <p:cNvPr id="1" name="">
+          <a:extLst>
+            <a:ext uri="{FF2B5EF4-FFF2-40B4-BE49-F238E27FC236}">
+              <a16:creationId xmlns:a16="http://schemas.microsoft.com/office/drawing/2014/main" id="{8A4060A1-F776-77A3-73B8-6FA0A8E0FB8B}"/>
+            </a:ext>
+          </a:extLst>
+        </p:cNvPr>
+        <p:cNvGrpSpPr/>
+        <p:nvPr/>
+      </p:nvGrpSpPr>
+      <p:grpSpPr>
+        <a:xfrm>
+          <a:off x="0" y="0"/>
+          <a:ext cx="0" cy="0"/>
+          <a:chOff x="0" y="0"/>
+          <a:chExt cx="0" cy="0"/>
+        </a:xfrm>
+      </p:grpSpPr>
+      <p:sp>
+        <p:nvSpPr>
+          <p:cNvPr id="2" name="Slide Image Placeholder 1">
+            <a:extLst>
+              <a:ext uri="{FF2B5EF4-FFF2-40B4-BE49-F238E27FC236}">
+                <a16:creationId xmlns:a16="http://schemas.microsoft.com/office/drawing/2014/main" id="{1FEA808E-5C22-6326-75C9-510F3CDFFBF7}"/>
+              </a:ext>
+            </a:extLst>
+          </p:cNvPr>
+          <p:cNvSpPr>
+            <a:spLocks noGrp="1" noRot="1" noChangeAspect="1"/>
+          </p:cNvSpPr>
+          <p:nvPr>
+            <p:ph type="sldImg"/>
+          </p:nvPr>
+        </p:nvSpPr>
+        <p:spPr/>
+      </p:sp>
+      <p:sp>
+        <p:nvSpPr>
+          <p:cNvPr id="3" name="Notes Placeholder 2">
+            <a:extLst>
+              <a:ext uri="{FF2B5EF4-FFF2-40B4-BE49-F238E27FC236}">
+                <a16:creationId xmlns:a16="http://schemas.microsoft.com/office/drawing/2014/main" id="{A4C511DA-8476-9EE9-2EB1-0829EEC42467}"/>
+              </a:ext>
+            </a:extLst>
+          </p:cNvPr>
+          <p:cNvSpPr>
+            <a:spLocks noGrp="1"/>
+          </p:cNvSpPr>
+          <p:nvPr>
+            <p:ph type="body" idx="1"/>
+          </p:nvPr>
+        </p:nvSpPr>
+        <p:spPr/>
+        <p:txBody>
+          <a:bodyPr/>
+          <a:lstStyle/>
+          <a:p>
+            <a:endParaRPr lang="en-IL" dirty="0"/>
+          </a:p>
+        </p:txBody>
+      </p:sp>
+      <p:sp>
+        <p:nvSpPr>
+          <p:cNvPr id="4" name="Slide Number Placeholder 3">
+            <a:extLst>
+              <a:ext uri="{FF2B5EF4-FFF2-40B4-BE49-F238E27FC236}">
+                <a16:creationId xmlns:a16="http://schemas.microsoft.com/office/drawing/2014/main" id="{9707244C-7C68-D217-9BB1-E8EC6A5E5921}"/>
+              </a:ext>
+            </a:extLst>
+          </p:cNvPr>
+          <p:cNvSpPr>
+            <a:spLocks noGrp="1"/>
+          </p:cNvSpPr>
+          <p:nvPr>
+            <p:ph type="sldNum" sz="quarter" idx="5"/>
+          </p:nvPr>
+        </p:nvSpPr>
+        <p:spPr/>
+        <p:txBody>
+          <a:bodyPr/>
+          <a:lstStyle/>
+          <a:p>
+            <a:fld id="{22289C57-55D7-40A4-A101-E74FAC7A092B}" type="slidenum">
+              <a:rPr lang="en-US" smtClean="0"/>
+              <a:t>9</a:t>
+            </a:fld>
+            <a:endParaRPr lang="en-US" dirty="0"/>
+          </a:p>
+        </p:txBody>
+      </p:sp>
+    </p:spTree>
+    <p:extLst>
+      <p:ext uri="{BB962C8B-B14F-4D97-AF65-F5344CB8AC3E}">
+        <p14:creationId xmlns:p14="http://schemas.microsoft.com/office/powerpoint/2010/main" val="1640387854"/>
       </p:ext>
     </p:extLst>
   </p:cSld>
@@ -7078,6 +7483,988 @@
     <p:extLst>
       <p:ext uri="{BB962C8B-B14F-4D97-AF65-F5344CB8AC3E}">
         <p14:creationId xmlns:p14="http://schemas.microsoft.com/office/powerpoint/2010/main" val="46454039"/>
+      </p:ext>
+    </p:extLst>
+  </p:cSld>
+  <p:clrMapOvr>
+    <a:masterClrMapping/>
+  </p:clrMapOvr>
+</p:sld>
+</file>
+
+<file path=ppt/slides/slide5.xml><?xml version="1.0" encoding="utf-8"?>
+<p:sld xmlns:a="http://schemas.openxmlformats.org/drawingml/2006/main" xmlns:r="http://schemas.openxmlformats.org/officeDocument/2006/relationships" xmlns:p="http://schemas.openxmlformats.org/presentationml/2006/main">
+  <p:cSld>
+    <p:spTree>
+      <p:nvGrpSpPr>
+        <p:cNvPr id="1" name=""/>
+        <p:cNvGrpSpPr/>
+        <p:nvPr/>
+      </p:nvGrpSpPr>
+      <p:grpSpPr>
+        <a:xfrm>
+          <a:off x="0" y="0"/>
+          <a:ext cx="0" cy="0"/>
+          <a:chOff x="0" y="0"/>
+          <a:chExt cx="0" cy="0"/>
+        </a:xfrm>
+      </p:grpSpPr>
+      <p:sp>
+        <p:nvSpPr>
+          <p:cNvPr id="2" name="Title 1">
+            <a:extLst>
+              <a:ext uri="{FF2B5EF4-FFF2-40B4-BE49-F238E27FC236}">
+                <a16:creationId xmlns:a16="http://schemas.microsoft.com/office/drawing/2014/main" id="{6B511EA8-C07B-E888-46D9-FBB45FD19E73}"/>
+              </a:ext>
+            </a:extLst>
+          </p:cNvPr>
+          <p:cNvSpPr>
+            <a:spLocks noGrp="1"/>
+          </p:cNvSpPr>
+          <p:nvPr>
+            <p:ph type="title"/>
+          </p:nvPr>
+        </p:nvSpPr>
+        <p:spPr/>
+        <p:txBody>
+          <a:bodyPr/>
+          <a:lstStyle/>
+          <a:p>
+            <a:pPr algn="r" rtl="1"/>
+            <a:r>
+              <a:rPr lang="he-IL" dirty="0"/>
+              <a:t>ממצאים – איפה ניתן למצוא את התוצאות</a:t>
+            </a:r>
+            <a:endParaRPr lang="en-IL" dirty="0"/>
+          </a:p>
+        </p:txBody>
+      </p:sp>
+      <p:sp>
+        <p:nvSpPr>
+          <p:cNvPr id="3" name="Content Placeholder 2">
+            <a:extLst>
+              <a:ext uri="{FF2B5EF4-FFF2-40B4-BE49-F238E27FC236}">
+                <a16:creationId xmlns:a16="http://schemas.microsoft.com/office/drawing/2014/main" id="{CF4371ED-7478-DB81-15EE-102E3421C05D}"/>
+              </a:ext>
+            </a:extLst>
+          </p:cNvPr>
+          <p:cNvSpPr>
+            <a:spLocks noGrp="1"/>
+          </p:cNvSpPr>
+          <p:nvPr>
+            <p:ph sz="half" idx="2"/>
+          </p:nvPr>
+        </p:nvSpPr>
+        <p:spPr/>
+        <p:txBody>
+          <a:bodyPr/>
+          <a:lstStyle/>
+          <a:p>
+            <a:pPr marL="285750" indent="-285750" algn="r" rtl="1">
+              <a:buFont typeface="Arial" panose="020B0604020202020204" pitchFamily="34" charset="0"/>
+              <a:buChar char="•"/>
+            </a:pPr>
+            <a:r>
+              <a:rPr lang="he-IL" dirty="0"/>
+              <a:t>את תוצאות הרצת התקיפה ניתן לראות בקובץ </a:t>
+            </a:r>
+            <a:r>
+              <a:rPr lang="en-US" dirty="0" err="1"/>
+              <a:t>attack_summary_results.json</a:t>
+            </a:r>
+            <a:r>
+              <a:rPr lang="he-IL" dirty="0"/>
+              <a:t>.</a:t>
+            </a:r>
+          </a:p>
+          <a:p>
+            <a:pPr marL="285750" indent="-285750" algn="r" rtl="1">
+              <a:buFont typeface="Arial" panose="020B0604020202020204" pitchFamily="34" charset="0"/>
+              <a:buChar char="•"/>
+            </a:pPr>
+            <a:r>
+              <a:rPr lang="he-IL" dirty="0"/>
+              <a:t>דוגמא למבנה של תוצאת התקפה:</a:t>
+            </a:r>
+          </a:p>
+          <a:p>
+            <a:pPr algn="r" rtl="1"/>
+            <a:endParaRPr lang="he-IL" dirty="0"/>
+          </a:p>
+        </p:txBody>
+      </p:sp>
+      <p:sp>
+        <p:nvSpPr>
+          <p:cNvPr id="4" name="Slide Number Placeholder 3">
+            <a:extLst>
+              <a:ext uri="{FF2B5EF4-FFF2-40B4-BE49-F238E27FC236}">
+                <a16:creationId xmlns:a16="http://schemas.microsoft.com/office/drawing/2014/main" id="{0DA4D009-EEB5-026D-29FB-83FE2882B0DB}"/>
+              </a:ext>
+            </a:extLst>
+          </p:cNvPr>
+          <p:cNvSpPr>
+            <a:spLocks noGrp="1"/>
+          </p:cNvSpPr>
+          <p:nvPr>
+            <p:ph type="sldNum" sz="quarter" idx="12"/>
+          </p:nvPr>
+        </p:nvSpPr>
+        <p:spPr/>
+        <p:txBody>
+          <a:bodyPr/>
+          <a:lstStyle/>
+          <a:p>
+            <a:fld id="{A49DFD55-3C28-40EF-9E31-A92D2E4017FF}" type="slidenum">
+              <a:rPr lang="en-US" smtClean="0"/>
+              <a:pPr/>
+              <a:t>5</a:t>
+            </a:fld>
+            <a:endParaRPr lang="en-US" dirty="0"/>
+          </a:p>
+        </p:txBody>
+      </p:sp>
+      <p:pic>
+        <p:nvPicPr>
+          <p:cNvPr id="6" name="Picture 5">
+            <a:extLst>
+              <a:ext uri="{FF2B5EF4-FFF2-40B4-BE49-F238E27FC236}">
+                <a16:creationId xmlns:a16="http://schemas.microsoft.com/office/drawing/2014/main" id="{7D9874F8-B34F-70B3-060A-FA5254496140}"/>
+              </a:ext>
+            </a:extLst>
+          </p:cNvPr>
+          <p:cNvPicPr>
+            <a:picLocks noChangeAspect="1"/>
+          </p:cNvPicPr>
+          <p:nvPr/>
+        </p:nvPicPr>
+        <p:blipFill>
+          <a:blip r:embed="rId2"/>
+          <a:stretch>
+            <a:fillRect/>
+          </a:stretch>
+        </p:blipFill>
+        <p:spPr>
+          <a:xfrm>
+            <a:off x="280987" y="3131860"/>
+            <a:ext cx="4346927" cy="3407051"/>
+          </a:xfrm>
+          <a:prstGeom prst="rect">
+            <a:avLst/>
+          </a:prstGeom>
+        </p:spPr>
+      </p:pic>
+    </p:spTree>
+    <p:extLst>
+      <p:ext uri="{BB962C8B-B14F-4D97-AF65-F5344CB8AC3E}">
+        <p14:creationId xmlns:p14="http://schemas.microsoft.com/office/powerpoint/2010/main" val="3316315987"/>
+      </p:ext>
+    </p:extLst>
+  </p:cSld>
+  <p:clrMapOvr>
+    <a:masterClrMapping/>
+  </p:clrMapOvr>
+</p:sld>
+</file>
+
+<file path=ppt/slides/slide6.xml><?xml version="1.0" encoding="utf-8"?>
+<p:sld xmlns:a="http://schemas.openxmlformats.org/drawingml/2006/main" xmlns:r="http://schemas.openxmlformats.org/officeDocument/2006/relationships" xmlns:p="http://schemas.openxmlformats.org/presentationml/2006/main">
+  <p:cSld>
+    <p:spTree>
+      <p:nvGrpSpPr>
+        <p:cNvPr id="1" name="">
+          <a:extLst>
+            <a:ext uri="{FF2B5EF4-FFF2-40B4-BE49-F238E27FC236}">
+              <a16:creationId xmlns:a16="http://schemas.microsoft.com/office/drawing/2014/main" id="{E9F85066-F9EF-9D1D-93BD-E215AE94AFC1}"/>
+            </a:ext>
+          </a:extLst>
+        </p:cNvPr>
+        <p:cNvGrpSpPr/>
+        <p:nvPr/>
+      </p:nvGrpSpPr>
+      <p:grpSpPr>
+        <a:xfrm>
+          <a:off x="0" y="0"/>
+          <a:ext cx="0" cy="0"/>
+          <a:chOff x="0" y="0"/>
+          <a:chExt cx="0" cy="0"/>
+        </a:xfrm>
+      </p:grpSpPr>
+      <p:sp>
+        <p:nvSpPr>
+          <p:cNvPr id="2" name="Title 1">
+            <a:extLst>
+              <a:ext uri="{FF2B5EF4-FFF2-40B4-BE49-F238E27FC236}">
+                <a16:creationId xmlns:a16="http://schemas.microsoft.com/office/drawing/2014/main" id="{17EF1B8E-73E3-0FD6-07C7-DE091B7B8AFE}"/>
+              </a:ext>
+            </a:extLst>
+          </p:cNvPr>
+          <p:cNvSpPr>
+            <a:spLocks noGrp="1"/>
+          </p:cNvSpPr>
+          <p:nvPr>
+            <p:ph type="title"/>
+          </p:nvPr>
+        </p:nvSpPr>
+        <p:spPr/>
+        <p:txBody>
+          <a:bodyPr/>
+          <a:lstStyle/>
+          <a:p>
+            <a:pPr algn="r" rtl="1"/>
+            <a:r>
+              <a:rPr lang="he-IL" dirty="0"/>
+              <a:t>ממצאים – השוואת מהירות מגנוני גיבוב </a:t>
+            </a:r>
+            <a:endParaRPr lang="en-IL" dirty="0"/>
+          </a:p>
+        </p:txBody>
+      </p:sp>
+      <p:sp>
+        <p:nvSpPr>
+          <p:cNvPr id="3" name="Content Placeholder 2">
+            <a:extLst>
+              <a:ext uri="{FF2B5EF4-FFF2-40B4-BE49-F238E27FC236}">
+                <a16:creationId xmlns:a16="http://schemas.microsoft.com/office/drawing/2014/main" id="{1CCAD9E0-CCB4-A980-0BDA-6771EFE7F37A}"/>
+              </a:ext>
+            </a:extLst>
+          </p:cNvPr>
+          <p:cNvSpPr>
+            <a:spLocks noGrp="1"/>
+          </p:cNvSpPr>
+          <p:nvPr>
+            <p:ph sz="half" idx="2"/>
+          </p:nvPr>
+        </p:nvSpPr>
+        <p:spPr/>
+        <p:txBody>
+          <a:bodyPr/>
+          <a:lstStyle/>
+          <a:p>
+            <a:pPr marL="285750" indent="-285750" algn="r" rtl="1">
+              <a:buFont typeface="Arial" panose="020B0604020202020204" pitchFamily="34" charset="0"/>
+              <a:buChar char="•"/>
+            </a:pPr>
+            <a:r>
+              <a:rPr lang="he-IL" dirty="0"/>
+              <a:t>השוואת מהירות מנגנוני גיבוב ללא מנגנוני הגנה דלוקים מראה ש</a:t>
+            </a:r>
+            <a:r>
+              <a:rPr lang="en-US" dirty="0"/>
+              <a:t>sha256</a:t>
+            </a:r>
+            <a:r>
+              <a:rPr lang="he-IL" dirty="0"/>
+              <a:t> בצע מספר עצום של ניסיונות חיבור בשניה אל מול </a:t>
+            </a:r>
+            <a:r>
+              <a:rPr lang="en-US" dirty="0"/>
+              <a:t>argon2 </a:t>
+            </a:r>
+            <a:r>
+              <a:rPr lang="he-IL" dirty="0"/>
+              <a:t> ו</a:t>
+            </a:r>
+            <a:r>
+              <a:rPr lang="en-US" dirty="0" err="1"/>
+              <a:t>bcrypt</a:t>
+            </a:r>
+            <a:r>
+              <a:rPr lang="he-IL" dirty="0"/>
+              <a:t> שבצעו משמעותית פחות. זה משקף את העיקרון הקריפטוגרפי עליו מתבססים מנגנוני גיבוב איטיים – להפוך כל ניחוש ליקר ולכן העלות של מתקפת </a:t>
+            </a:r>
+            <a:r>
+              <a:rPr lang="en-US" dirty="0"/>
+              <a:t>Brute-Force</a:t>
+            </a:r>
+            <a:r>
+              <a:rPr lang="he-IL" dirty="0"/>
+              <a:t> הופכת ליקרה מאוד.</a:t>
+            </a:r>
+          </a:p>
+          <a:p>
+            <a:pPr marL="285750" indent="-285750" algn="r" rtl="1">
+              <a:buFont typeface="Arial" panose="020B0604020202020204" pitchFamily="34" charset="0"/>
+              <a:buChar char="•"/>
+            </a:pPr>
+            <a:r>
+              <a:rPr lang="he-IL" dirty="0"/>
+              <a:t> </a:t>
+            </a:r>
+          </a:p>
+          <a:p>
+            <a:pPr marL="285750" indent="-285750" algn="r" rtl="1">
+              <a:buFont typeface="Arial" panose="020B0604020202020204" pitchFamily="34" charset="0"/>
+              <a:buChar char="•"/>
+            </a:pPr>
+            <a:endParaRPr lang="en-IL" dirty="0"/>
+          </a:p>
+        </p:txBody>
+      </p:sp>
+      <p:sp>
+        <p:nvSpPr>
+          <p:cNvPr id="4" name="Slide Number Placeholder 3">
+            <a:extLst>
+              <a:ext uri="{FF2B5EF4-FFF2-40B4-BE49-F238E27FC236}">
+                <a16:creationId xmlns:a16="http://schemas.microsoft.com/office/drawing/2014/main" id="{B218D7C6-C858-D764-E48E-096AE869FBC3}"/>
+              </a:ext>
+            </a:extLst>
+          </p:cNvPr>
+          <p:cNvSpPr>
+            <a:spLocks noGrp="1"/>
+          </p:cNvSpPr>
+          <p:nvPr>
+            <p:ph type="sldNum" sz="quarter" idx="12"/>
+          </p:nvPr>
+        </p:nvSpPr>
+        <p:spPr/>
+        <p:txBody>
+          <a:bodyPr/>
+          <a:lstStyle/>
+          <a:p>
+            <a:fld id="{A49DFD55-3C28-40EF-9E31-A92D2E4017FF}" type="slidenum">
+              <a:rPr lang="en-US" smtClean="0"/>
+              <a:pPr/>
+              <a:t>6</a:t>
+            </a:fld>
+            <a:endParaRPr lang="en-US" dirty="0"/>
+          </a:p>
+        </p:txBody>
+      </p:sp>
+      <p:pic>
+        <p:nvPicPr>
+          <p:cNvPr id="7" name="Picture 6">
+            <a:extLst>
+              <a:ext uri="{FF2B5EF4-FFF2-40B4-BE49-F238E27FC236}">
+                <a16:creationId xmlns:a16="http://schemas.microsoft.com/office/drawing/2014/main" id="{1016E888-F564-36DC-3F81-21D16A9427D9}"/>
+              </a:ext>
+            </a:extLst>
+          </p:cNvPr>
+          <p:cNvPicPr>
+            <a:picLocks noChangeAspect="1"/>
+          </p:cNvPicPr>
+          <p:nvPr/>
+        </p:nvPicPr>
+        <p:blipFill>
+          <a:blip r:embed="rId2"/>
+          <a:stretch>
+            <a:fillRect/>
+          </a:stretch>
+        </p:blipFill>
+        <p:spPr>
+          <a:xfrm>
+            <a:off x="1533525" y="4352924"/>
+            <a:ext cx="6738937" cy="1606059"/>
+          </a:xfrm>
+          <a:prstGeom prst="rect">
+            <a:avLst/>
+          </a:prstGeom>
+        </p:spPr>
+      </p:pic>
+    </p:spTree>
+    <p:extLst>
+      <p:ext uri="{BB962C8B-B14F-4D97-AF65-F5344CB8AC3E}">
+        <p14:creationId xmlns:p14="http://schemas.microsoft.com/office/powerpoint/2010/main" val="2976962570"/>
+      </p:ext>
+    </p:extLst>
+  </p:cSld>
+  <p:clrMapOvr>
+    <a:masterClrMapping/>
+  </p:clrMapOvr>
+</p:sld>
+</file>
+
+<file path=ppt/slides/slide7.xml><?xml version="1.0" encoding="utf-8"?>
+<p:sld xmlns:a="http://schemas.openxmlformats.org/drawingml/2006/main" xmlns:r="http://schemas.openxmlformats.org/officeDocument/2006/relationships" xmlns:p="http://schemas.openxmlformats.org/presentationml/2006/main">
+  <p:cSld>
+    <p:spTree>
+      <p:nvGrpSpPr>
+        <p:cNvPr id="1" name="">
+          <a:extLst>
+            <a:ext uri="{FF2B5EF4-FFF2-40B4-BE49-F238E27FC236}">
+              <a16:creationId xmlns:a16="http://schemas.microsoft.com/office/drawing/2014/main" id="{135E7B08-C9A0-7164-0197-6849E6A3968A}"/>
+            </a:ext>
+          </a:extLst>
+        </p:cNvPr>
+        <p:cNvGrpSpPr/>
+        <p:nvPr/>
+      </p:nvGrpSpPr>
+      <p:grpSpPr>
+        <a:xfrm>
+          <a:off x="0" y="0"/>
+          <a:ext cx="0" cy="0"/>
+          <a:chOff x="0" y="0"/>
+          <a:chExt cx="0" cy="0"/>
+        </a:xfrm>
+      </p:grpSpPr>
+      <p:sp>
+        <p:nvSpPr>
+          <p:cNvPr id="2" name="Title 1">
+            <a:extLst>
+              <a:ext uri="{FF2B5EF4-FFF2-40B4-BE49-F238E27FC236}">
+                <a16:creationId xmlns:a16="http://schemas.microsoft.com/office/drawing/2014/main" id="{89694BD3-02E7-0BBD-A48D-5D7F6125FC56}"/>
+              </a:ext>
+            </a:extLst>
+          </p:cNvPr>
+          <p:cNvSpPr>
+            <a:spLocks noGrp="1"/>
+          </p:cNvSpPr>
+          <p:nvPr>
+            <p:ph type="title"/>
+          </p:nvPr>
+        </p:nvSpPr>
+        <p:spPr/>
+        <p:txBody>
+          <a:bodyPr/>
+          <a:lstStyle/>
+          <a:p>
+            <a:pPr algn="r" rtl="1"/>
+            <a:r>
+              <a:rPr lang="he-IL" dirty="0"/>
+              <a:t>ממצאים – תקיפה מבוססת </a:t>
+            </a:r>
+            <a:r>
+              <a:rPr lang="en-US" dirty="0"/>
+              <a:t>Brute-force</a:t>
+            </a:r>
+            <a:endParaRPr lang="en-IL" dirty="0"/>
+          </a:p>
+        </p:txBody>
+      </p:sp>
+      <p:sp>
+        <p:nvSpPr>
+          <p:cNvPr id="3" name="Content Placeholder 2">
+            <a:extLst>
+              <a:ext uri="{FF2B5EF4-FFF2-40B4-BE49-F238E27FC236}">
+                <a16:creationId xmlns:a16="http://schemas.microsoft.com/office/drawing/2014/main" id="{D2C7D23C-2C13-E871-1C10-1CBB0ED1E74B}"/>
+              </a:ext>
+            </a:extLst>
+          </p:cNvPr>
+          <p:cNvSpPr>
+            <a:spLocks noGrp="1"/>
+          </p:cNvSpPr>
+          <p:nvPr>
+            <p:ph sz="half" idx="2"/>
+          </p:nvPr>
+        </p:nvSpPr>
+        <p:spPr/>
+        <p:txBody>
+          <a:bodyPr/>
+          <a:lstStyle/>
+          <a:p>
+            <a:pPr marL="285750" indent="-285750" algn="r" rtl="1">
+              <a:buFont typeface="Arial" panose="020B0604020202020204" pitchFamily="34" charset="0"/>
+              <a:buChar char="•"/>
+            </a:pPr>
+            <a:r>
+              <a:rPr lang="he-IL" dirty="0"/>
+              <a:t> </a:t>
+            </a:r>
+          </a:p>
+          <a:p>
+            <a:pPr marL="285750" indent="-285750" algn="r" rtl="1">
+              <a:buFont typeface="Arial" panose="020B0604020202020204" pitchFamily="34" charset="0"/>
+              <a:buChar char="•"/>
+            </a:pPr>
+            <a:endParaRPr lang="en-IL" dirty="0"/>
+          </a:p>
+        </p:txBody>
+      </p:sp>
+      <p:sp>
+        <p:nvSpPr>
+          <p:cNvPr id="4" name="Slide Number Placeholder 3">
+            <a:extLst>
+              <a:ext uri="{FF2B5EF4-FFF2-40B4-BE49-F238E27FC236}">
+                <a16:creationId xmlns:a16="http://schemas.microsoft.com/office/drawing/2014/main" id="{70745B6A-7FA0-EE69-AE1C-C6337B2ABEC7}"/>
+              </a:ext>
+            </a:extLst>
+          </p:cNvPr>
+          <p:cNvSpPr>
+            <a:spLocks noGrp="1"/>
+          </p:cNvSpPr>
+          <p:nvPr>
+            <p:ph type="sldNum" sz="quarter" idx="12"/>
+          </p:nvPr>
+        </p:nvSpPr>
+        <p:spPr/>
+        <p:txBody>
+          <a:bodyPr/>
+          <a:lstStyle/>
+          <a:p>
+            <a:fld id="{A49DFD55-3C28-40EF-9E31-A92D2E4017FF}" type="slidenum">
+              <a:rPr lang="en-US" smtClean="0"/>
+              <a:pPr/>
+              <a:t>7</a:t>
+            </a:fld>
+            <a:endParaRPr lang="en-US" dirty="0"/>
+          </a:p>
+        </p:txBody>
+      </p:sp>
+      <p:pic>
+        <p:nvPicPr>
+          <p:cNvPr id="6" name="Picture 5">
+            <a:extLst>
+              <a:ext uri="{FF2B5EF4-FFF2-40B4-BE49-F238E27FC236}">
+                <a16:creationId xmlns:a16="http://schemas.microsoft.com/office/drawing/2014/main" id="{308B3D73-64EE-EAA8-A547-C69630B67E9B}"/>
+              </a:ext>
+            </a:extLst>
+          </p:cNvPr>
+          <p:cNvPicPr>
+            <a:picLocks noChangeAspect="1"/>
+          </p:cNvPicPr>
+          <p:nvPr/>
+        </p:nvPicPr>
+        <p:blipFill>
+          <a:blip r:embed="rId2"/>
+          <a:stretch>
+            <a:fillRect/>
+          </a:stretch>
+        </p:blipFill>
+        <p:spPr>
+          <a:xfrm>
+            <a:off x="1847850" y="2676524"/>
+            <a:ext cx="6400800" cy="3519411"/>
+          </a:xfrm>
+          <a:prstGeom prst="rect">
+            <a:avLst/>
+          </a:prstGeom>
+        </p:spPr>
+      </p:pic>
+    </p:spTree>
+    <p:extLst>
+      <p:ext uri="{BB962C8B-B14F-4D97-AF65-F5344CB8AC3E}">
+        <p14:creationId xmlns:p14="http://schemas.microsoft.com/office/powerpoint/2010/main" val="330860302"/>
+      </p:ext>
+    </p:extLst>
+  </p:cSld>
+  <p:clrMapOvr>
+    <a:masterClrMapping/>
+  </p:clrMapOvr>
+</p:sld>
+</file>
+
+<file path=ppt/slides/slide8.xml><?xml version="1.0" encoding="utf-8"?>
+<p:sld xmlns:a="http://schemas.openxmlformats.org/drawingml/2006/main" xmlns:r="http://schemas.openxmlformats.org/officeDocument/2006/relationships" xmlns:p="http://schemas.openxmlformats.org/presentationml/2006/main">
+  <p:cSld>
+    <p:spTree>
+      <p:nvGrpSpPr>
+        <p:cNvPr id="1" name="">
+          <a:extLst>
+            <a:ext uri="{FF2B5EF4-FFF2-40B4-BE49-F238E27FC236}">
+              <a16:creationId xmlns:a16="http://schemas.microsoft.com/office/drawing/2014/main" id="{0C5680E2-544F-8917-828D-8AB5EB9DB353}"/>
+            </a:ext>
+          </a:extLst>
+        </p:cNvPr>
+        <p:cNvGrpSpPr/>
+        <p:nvPr/>
+      </p:nvGrpSpPr>
+      <p:grpSpPr>
+        <a:xfrm>
+          <a:off x="0" y="0"/>
+          <a:ext cx="0" cy="0"/>
+          <a:chOff x="0" y="0"/>
+          <a:chExt cx="0" cy="0"/>
+        </a:xfrm>
+      </p:grpSpPr>
+      <p:sp>
+        <p:nvSpPr>
+          <p:cNvPr id="2" name="Title 1">
+            <a:extLst>
+              <a:ext uri="{FF2B5EF4-FFF2-40B4-BE49-F238E27FC236}">
+                <a16:creationId xmlns:a16="http://schemas.microsoft.com/office/drawing/2014/main" id="{1F818B17-BB9C-9788-F09A-14413054C036}"/>
+              </a:ext>
+            </a:extLst>
+          </p:cNvPr>
+          <p:cNvSpPr>
+            <a:spLocks noGrp="1"/>
+          </p:cNvSpPr>
+          <p:nvPr>
+            <p:ph type="title"/>
+          </p:nvPr>
+        </p:nvSpPr>
+        <p:spPr>
+          <a:xfrm>
+            <a:off x="285750" y="268360"/>
+            <a:ext cx="8743950" cy="1569965"/>
+          </a:xfrm>
+        </p:spPr>
+        <p:txBody>
+          <a:bodyPr/>
+          <a:lstStyle/>
+          <a:p>
+            <a:pPr algn="r" rtl="1"/>
+            <a:r>
+              <a:rPr lang="he-IL" dirty="0"/>
+              <a:t>ממצאים – תקיפה מבוססת </a:t>
+            </a:r>
+            <a:r>
+              <a:rPr lang="en-US" dirty="0"/>
+              <a:t>Password spraying</a:t>
+            </a:r>
+            <a:endParaRPr lang="en-IL" dirty="0"/>
+          </a:p>
+        </p:txBody>
+      </p:sp>
+      <p:sp>
+        <p:nvSpPr>
+          <p:cNvPr id="3" name="Content Placeholder 2">
+            <a:extLst>
+              <a:ext uri="{FF2B5EF4-FFF2-40B4-BE49-F238E27FC236}">
+                <a16:creationId xmlns:a16="http://schemas.microsoft.com/office/drawing/2014/main" id="{B7FA9393-76A2-0DD2-0601-E79E895E3D39}"/>
+              </a:ext>
+            </a:extLst>
+          </p:cNvPr>
+          <p:cNvSpPr>
+            <a:spLocks noGrp="1"/>
+          </p:cNvSpPr>
+          <p:nvPr>
+            <p:ph sz="half" idx="2"/>
+          </p:nvPr>
+        </p:nvSpPr>
+        <p:spPr>
+          <a:xfrm>
+            <a:off x="1293813" y="2276172"/>
+            <a:ext cx="7288212" cy="3407051"/>
+          </a:xfrm>
+        </p:spPr>
+        <p:txBody>
+          <a:bodyPr/>
+          <a:lstStyle/>
+          <a:p>
+            <a:pPr marL="285750" indent="-285750" algn="r" rtl="1">
+              <a:buFont typeface="Arial" panose="020B0604020202020204" pitchFamily="34" charset="0"/>
+              <a:buChar char="•"/>
+            </a:pPr>
+            <a:r>
+              <a:rPr lang="he-IL" dirty="0"/>
+              <a:t> מכיוון שהמתקפה משתמשת בסיסמה אחת נגד מספר גדול של משתמשים, מספר הניסיונות הנדרש נמוך מאוד, למעשה בכל אחת מהבדיקות נמצאה סיסמה לאחר סבב אחד בלבד של ניסיונות חיבור.</a:t>
+            </a:r>
+            <a:endParaRPr lang="en-US" dirty="0"/>
+          </a:p>
+          <a:p>
+            <a:pPr marL="285750" indent="-285750" algn="r" rtl="1">
+              <a:buFont typeface="Arial" panose="020B0604020202020204" pitchFamily="34" charset="0"/>
+              <a:buChar char="•"/>
+            </a:pPr>
+            <a:r>
+              <a:rPr lang="he-IL" dirty="0"/>
+              <a:t>לכן מנגנוני הגנה כמו </a:t>
+            </a:r>
+            <a:r>
+              <a:rPr lang="en-US" dirty="0"/>
+              <a:t>Lockout </a:t>
+            </a:r>
+            <a:r>
+              <a:rPr lang="he-IL" dirty="0"/>
+              <a:t> ו- </a:t>
+            </a:r>
+            <a:r>
+              <a:rPr lang="en-US" dirty="0"/>
+              <a:t>Rate-Limiting</a:t>
+            </a:r>
+            <a:r>
+              <a:rPr lang="he-IL" dirty="0"/>
+              <a:t> כמעט אינם באים לידי ביטוי. הם מופעלים רק לאחר מספר כישלונות רצופים על אותו משתמש, אך סוג מתקפה זה מחלק את הניסיונות בין משתמשים שונים</a:t>
+            </a:r>
+            <a:r>
+              <a:rPr lang="en-US" dirty="0"/>
+              <a:t>.</a:t>
+            </a:r>
+            <a:endParaRPr lang="en-IL" dirty="0"/>
+          </a:p>
+        </p:txBody>
+      </p:sp>
+      <p:sp>
+        <p:nvSpPr>
+          <p:cNvPr id="4" name="Slide Number Placeholder 3">
+            <a:extLst>
+              <a:ext uri="{FF2B5EF4-FFF2-40B4-BE49-F238E27FC236}">
+                <a16:creationId xmlns:a16="http://schemas.microsoft.com/office/drawing/2014/main" id="{82D9C265-557A-0C80-7D26-CD16C0D697AE}"/>
+              </a:ext>
+            </a:extLst>
+          </p:cNvPr>
+          <p:cNvSpPr>
+            <a:spLocks noGrp="1"/>
+          </p:cNvSpPr>
+          <p:nvPr>
+            <p:ph type="sldNum" sz="quarter" idx="12"/>
+          </p:nvPr>
+        </p:nvSpPr>
+        <p:spPr/>
+        <p:txBody>
+          <a:bodyPr/>
+          <a:lstStyle/>
+          <a:p>
+            <a:fld id="{A49DFD55-3C28-40EF-9E31-A92D2E4017FF}" type="slidenum">
+              <a:rPr lang="en-US" smtClean="0"/>
+              <a:pPr/>
+              <a:t>8</a:t>
+            </a:fld>
+            <a:endParaRPr lang="en-US" dirty="0"/>
+          </a:p>
+        </p:txBody>
+      </p:sp>
+      <p:pic>
+        <p:nvPicPr>
+          <p:cNvPr id="7" name="Picture 6">
+            <a:extLst>
+              <a:ext uri="{FF2B5EF4-FFF2-40B4-BE49-F238E27FC236}">
+                <a16:creationId xmlns:a16="http://schemas.microsoft.com/office/drawing/2014/main" id="{E02EAA48-D1F8-856A-6346-8D3F89232719}"/>
+              </a:ext>
+            </a:extLst>
+          </p:cNvPr>
+          <p:cNvPicPr>
+            <a:picLocks noChangeAspect="1"/>
+          </p:cNvPicPr>
+          <p:nvPr/>
+        </p:nvPicPr>
+        <p:blipFill>
+          <a:blip r:embed="rId3"/>
+          <a:stretch>
+            <a:fillRect/>
+          </a:stretch>
+        </p:blipFill>
+        <p:spPr>
+          <a:xfrm>
+            <a:off x="2047875" y="4216703"/>
+            <a:ext cx="6429375" cy="2139646"/>
+          </a:xfrm>
+          <a:prstGeom prst="rect">
+            <a:avLst/>
+          </a:prstGeom>
+        </p:spPr>
+      </p:pic>
+    </p:spTree>
+    <p:extLst>
+      <p:ext uri="{BB962C8B-B14F-4D97-AF65-F5344CB8AC3E}">
+        <p14:creationId xmlns:p14="http://schemas.microsoft.com/office/powerpoint/2010/main" val="3632765082"/>
+      </p:ext>
+    </p:extLst>
+  </p:cSld>
+  <p:clrMapOvr>
+    <a:masterClrMapping/>
+  </p:clrMapOvr>
+</p:sld>
+</file>
+
+<file path=ppt/slides/slide9.xml><?xml version="1.0" encoding="utf-8"?>
+<p:sld xmlns:a="http://schemas.openxmlformats.org/drawingml/2006/main" xmlns:r="http://schemas.openxmlformats.org/officeDocument/2006/relationships" xmlns:p="http://schemas.openxmlformats.org/presentationml/2006/main">
+  <p:cSld>
+    <p:spTree>
+      <p:nvGrpSpPr>
+        <p:cNvPr id="1" name="">
+          <a:extLst>
+            <a:ext uri="{FF2B5EF4-FFF2-40B4-BE49-F238E27FC236}">
+              <a16:creationId xmlns:a16="http://schemas.microsoft.com/office/drawing/2014/main" id="{7CAA7937-9BC8-685E-B9DB-07E9DD7150AA}"/>
+            </a:ext>
+          </a:extLst>
+        </p:cNvPr>
+        <p:cNvGrpSpPr/>
+        <p:nvPr/>
+      </p:nvGrpSpPr>
+      <p:grpSpPr>
+        <a:xfrm>
+          <a:off x="0" y="0"/>
+          <a:ext cx="0" cy="0"/>
+          <a:chOff x="0" y="0"/>
+          <a:chExt cx="0" cy="0"/>
+        </a:xfrm>
+      </p:grpSpPr>
+      <p:sp>
+        <p:nvSpPr>
+          <p:cNvPr id="2" name="Title 1">
+            <a:extLst>
+              <a:ext uri="{FF2B5EF4-FFF2-40B4-BE49-F238E27FC236}">
+                <a16:creationId xmlns:a16="http://schemas.microsoft.com/office/drawing/2014/main" id="{BBD333AB-8378-75FA-C792-C3A442AA74A4}"/>
+              </a:ext>
+            </a:extLst>
+          </p:cNvPr>
+          <p:cNvSpPr>
+            <a:spLocks noGrp="1"/>
+          </p:cNvSpPr>
+          <p:nvPr>
+            <p:ph type="title"/>
+          </p:nvPr>
+        </p:nvSpPr>
+        <p:spPr>
+          <a:xfrm>
+            <a:off x="285750" y="268360"/>
+            <a:ext cx="8743950" cy="1227065"/>
+          </a:xfrm>
+        </p:spPr>
+        <p:txBody>
+          <a:bodyPr/>
+          <a:lstStyle/>
+          <a:p>
+            <a:pPr algn="r" rtl="1"/>
+            <a:r>
+              <a:rPr lang="he-IL" dirty="0"/>
+              <a:t>ממצאים – מסקנות</a:t>
+            </a:r>
+            <a:endParaRPr lang="en-IL" dirty="0"/>
+          </a:p>
+        </p:txBody>
+      </p:sp>
+      <p:sp>
+        <p:nvSpPr>
+          <p:cNvPr id="3" name="Content Placeholder 2">
+            <a:extLst>
+              <a:ext uri="{FF2B5EF4-FFF2-40B4-BE49-F238E27FC236}">
+                <a16:creationId xmlns:a16="http://schemas.microsoft.com/office/drawing/2014/main" id="{02FF29F5-09C9-9E57-31A4-1CDD0C89EBB1}"/>
+              </a:ext>
+            </a:extLst>
+          </p:cNvPr>
+          <p:cNvSpPr>
+            <a:spLocks noGrp="1"/>
+          </p:cNvSpPr>
+          <p:nvPr>
+            <p:ph sz="half" idx="2"/>
+          </p:nvPr>
+        </p:nvSpPr>
+        <p:spPr>
+          <a:xfrm>
+            <a:off x="1293812" y="1571626"/>
+            <a:ext cx="8269287" cy="4638674"/>
+          </a:xfrm>
+        </p:spPr>
+        <p:txBody>
+          <a:bodyPr>
+            <a:normAutofit/>
+          </a:bodyPr>
+          <a:lstStyle/>
+          <a:p>
+            <a:pPr marL="285750" indent="-285750" algn="r" rtl="1">
+              <a:buFont typeface="Arial" panose="020B0604020202020204" pitchFamily="34" charset="0"/>
+              <a:buChar char="•"/>
+            </a:pPr>
+            <a:r>
+              <a:rPr lang="he-IL" dirty="0"/>
+              <a:t>התוצאות מדגישות שההגנות הקלאסיות נגד </a:t>
+            </a:r>
+            <a:r>
+              <a:rPr lang="en-US" dirty="0"/>
+              <a:t>Brute-Force</a:t>
+            </a:r>
+            <a:r>
+              <a:rPr lang="he-IL" dirty="0"/>
+              <a:t> אינן אפקטיביות נגד </a:t>
+            </a:r>
+            <a:r>
+              <a:rPr lang="en-US" dirty="0"/>
+              <a:t>Password Spraying</a:t>
+            </a:r>
+            <a:r>
+              <a:rPr lang="he-IL" dirty="0"/>
+              <a:t>.</a:t>
+            </a:r>
+          </a:p>
+          <a:p>
+            <a:pPr marL="285750" indent="-285750" algn="r" rtl="1">
+              <a:buFont typeface="Arial" panose="020B0604020202020204" pitchFamily="34" charset="0"/>
+              <a:buChar char="•"/>
+            </a:pPr>
+            <a:r>
+              <a:rPr lang="he-IL" dirty="0"/>
+              <a:t>גורם ההכרעה המרכזי הוא קיומן של סיסמאות חלשות במאגר. לכן יש לחייב את המשתמש לבחור סיסמא חזקה, כזאת שלא נמצאת במאגר הסיסמאות הנפוצות ושקשה לנחש.</a:t>
+            </a:r>
+          </a:p>
+          <a:p>
+            <a:pPr marL="285750" indent="-285750" algn="r" rtl="1">
+              <a:buFont typeface="Arial" panose="020B0604020202020204" pitchFamily="34" charset="0"/>
+              <a:buChar char="•"/>
+            </a:pPr>
+            <a:r>
+              <a:rPr lang="he-IL" dirty="0"/>
+              <a:t>מימוש מלא של הגנות </a:t>
+            </a:r>
+            <a:r>
+              <a:rPr lang="en-US" dirty="0"/>
+              <a:t>TOTP </a:t>
+            </a:r>
+            <a:r>
+              <a:rPr lang="he-IL" dirty="0"/>
+              <a:t> ו/או </a:t>
+            </a:r>
+            <a:r>
+              <a:rPr lang="en-US" dirty="0"/>
+              <a:t>Captcha</a:t>
+            </a:r>
+            <a:r>
+              <a:rPr lang="he-IL" dirty="0"/>
+              <a:t> מהווה מרכיב קריטי בהגנה בפני מתקפות וחשוב ליישם.</a:t>
+            </a:r>
+          </a:p>
+          <a:p>
+            <a:pPr marL="285750" indent="-285750" algn="r" rtl="1">
+              <a:buFont typeface="Arial" panose="020B0604020202020204" pitchFamily="34" charset="0"/>
+              <a:buChar char="•"/>
+            </a:pPr>
+            <a:r>
+              <a:rPr lang="he-IL" dirty="0"/>
+              <a:t>יש לשקול ניתוח של ניסיונות התחברות בהקשר רחב. הדבר שהכי בלט לנו הוא שמרבית ההגנות מתייחסות לניסיון התחברות של משתמש נקודתי, והדבר לא מונע מתקפת</a:t>
+            </a:r>
+            <a:r>
+              <a:rPr lang="en-US" dirty="0"/>
+              <a:t>Password Spraying </a:t>
+            </a:r>
+            <a:r>
+              <a:rPr lang="he-IL" dirty="0"/>
+              <a:t>. יש לבצע ניתוח חכם יותר של כל ניסיון התחברות, ולזהות מצב שבו אדם זדוני מנסה להתחבר מספר פעמים גם אם למשתמשים שונים.</a:t>
+            </a:r>
+          </a:p>
+          <a:p>
+            <a:pPr marL="285750" indent="-285750" algn="r" rtl="1">
+              <a:buFont typeface="Arial" panose="020B0604020202020204" pitchFamily="34" charset="0"/>
+              <a:buChar char="•"/>
+            </a:pPr>
+            <a:r>
+              <a:rPr lang="he-IL" dirty="0"/>
+              <a:t>חשוב גם להגן על משתמשים מפני ניסיון </a:t>
+            </a:r>
+            <a:r>
+              <a:rPr lang="en-US" dirty="0"/>
+              <a:t>Dos </a:t>
+            </a:r>
+            <a:r>
+              <a:rPr lang="he-IL" dirty="0"/>
+              <a:t>שיגביל אותם מהאפשרות להתחבר.</a:t>
+            </a:r>
+          </a:p>
+        </p:txBody>
+      </p:sp>
+      <p:sp>
+        <p:nvSpPr>
+          <p:cNvPr id="4" name="Slide Number Placeholder 3">
+            <a:extLst>
+              <a:ext uri="{FF2B5EF4-FFF2-40B4-BE49-F238E27FC236}">
+                <a16:creationId xmlns:a16="http://schemas.microsoft.com/office/drawing/2014/main" id="{6A306F65-F9EF-8286-D9CF-7635F6E159AB}"/>
+              </a:ext>
+            </a:extLst>
+          </p:cNvPr>
+          <p:cNvSpPr>
+            <a:spLocks noGrp="1"/>
+          </p:cNvSpPr>
+          <p:nvPr>
+            <p:ph type="sldNum" sz="quarter" idx="12"/>
+          </p:nvPr>
+        </p:nvSpPr>
+        <p:spPr/>
+        <p:txBody>
+          <a:bodyPr/>
+          <a:lstStyle/>
+          <a:p>
+            <a:fld id="{A49DFD55-3C28-40EF-9E31-A92D2E4017FF}" type="slidenum">
+              <a:rPr lang="en-US" smtClean="0"/>
+              <a:pPr/>
+              <a:t>9</a:t>
+            </a:fld>
+            <a:endParaRPr lang="en-US" dirty="0"/>
+          </a:p>
+        </p:txBody>
+      </p:sp>
+    </p:spTree>
+    <p:extLst>
+      <p:ext uri="{BB962C8B-B14F-4D97-AF65-F5344CB8AC3E}">
+        <p14:creationId xmlns:p14="http://schemas.microsoft.com/office/powerpoint/2010/main" val="1475473579"/>
       </p:ext>
     </p:extLst>
   </p:cSld>
@@ -7879,6 +9266,35 @@
 </file>
 
 <file path=customXml/item1.xml><?xml version="1.0" encoding="utf-8"?>
+<?mso-contentType ?>
+<FormTemplates xmlns="http://schemas.microsoft.com/sharepoint/v3/contenttype/forms">
+  <Display>DocumentLibraryForm</Display>
+  <Edit>DocumentLibraryForm</Edit>
+  <New>DocumentLibraryForm</New>
+</FormTemplates>
+</file>
+
+<file path=customXml/item2.xml><?xml version="1.0" encoding="utf-8"?>
+<p:properties xmlns:p="http://schemas.microsoft.com/office/2006/metadata/properties" xmlns:xsi="http://www.w3.org/2001/XMLSchema-instance" xmlns:pc="http://schemas.microsoft.com/office/infopath/2007/PartnerControls">
+  <documentManagement>
+    <_ip_UnifiedCompliancePolicyUIAction xmlns="http://schemas.microsoft.com/sharepoint/v3" xsi:nil="true"/>
+    <Image xmlns="71af3243-3dd4-4a8d-8c0d-dd76da1f02a5">
+      <Url xsi:nil="true"/>
+      <Description xsi:nil="true"/>
+    </Image>
+    <Status xmlns="71af3243-3dd4-4a8d-8c0d-dd76da1f02a5">Not started</Status>
+    <Background xmlns="71af3243-3dd4-4a8d-8c0d-dd76da1f02a5">false</Background>
+    <_ip_UnifiedCompliancePolicyProperties xmlns="http://schemas.microsoft.com/sharepoint/v3" xsi:nil="true"/>
+    <ImageTagsTaxHTField xmlns="71af3243-3dd4-4a8d-8c0d-dd76da1f02a5">
+      <Terms xmlns="http://schemas.microsoft.com/office/infopath/2007/PartnerControls"/>
+    </ImageTagsTaxHTField>
+    <TaxCatchAll xmlns="230e9df3-be65-4c73-a93b-d1236ebd677e" xsi:nil="true"/>
+    <MediaServiceKeyPoints xmlns="71af3243-3dd4-4a8d-8c0d-dd76da1f02a5" xsi:nil="true"/>
+  </documentManagement>
+</p:properties>
+</file>
+
+<file path=customXml/item3.xml><?xml version="1.0" encoding="utf-8"?>
 <ct:contentTypeSchema xmlns:ct="http://schemas.microsoft.com/office/2006/metadata/contentType" xmlns:ma="http://schemas.microsoft.com/office/2006/metadata/properties/metaAttributes" ct:_="" ma:_="" ma:contentTypeName="Document" ma:contentTypeID="0x01010079F111ED35F8CC479449609E8A0923A6" ma:contentTypeVersion="28" ma:contentTypeDescription="Create a new document." ma:contentTypeScope="" ma:versionID="60f5a4f2d2b0abadcf532d48ebf9cb71">
   <xsd:schema xmlns:xsd="http://www.w3.org/2001/XMLSchema" xmlns:xs="http://www.w3.org/2001/XMLSchema" xmlns:p="http://schemas.microsoft.com/office/2006/metadata/properties" xmlns:ns1="http://schemas.microsoft.com/sharepoint/v3" xmlns:ns2="71af3243-3dd4-4a8d-8c0d-dd76da1f02a5" xmlns:ns3="16c05727-aa75-4e4a-9b5f-8a80a1165891" xmlns:ns4="230e9df3-be65-4c73-a93b-d1236ebd677e" targetNamespace="http://schemas.microsoft.com/office/2006/metadata/properties" ma:root="true" ma:fieldsID="7dd78129e6a1811f84807ad11c651531" ns1:_="" ns2:_="" ns3:_="" ns4:_="">
     <xsd:import namespace="http://schemas.microsoft.com/sharepoint/v3"/>
@@ -8190,36 +9606,27 @@
 </ct:contentTypeSchema>
 </file>
 
-<file path=customXml/item2.xml><?xml version="1.0" encoding="utf-8"?>
-<p:properties xmlns:p="http://schemas.microsoft.com/office/2006/metadata/properties" xmlns:xsi="http://www.w3.org/2001/XMLSchema-instance" xmlns:pc="http://schemas.microsoft.com/office/infopath/2007/PartnerControls">
-  <documentManagement>
-    <_ip_UnifiedCompliancePolicyUIAction xmlns="http://schemas.microsoft.com/sharepoint/v3" xsi:nil="true"/>
-    <Image xmlns="71af3243-3dd4-4a8d-8c0d-dd76da1f02a5">
-      <Url xsi:nil="true"/>
-      <Description xsi:nil="true"/>
-    </Image>
-    <Status xmlns="71af3243-3dd4-4a8d-8c0d-dd76da1f02a5">Not started</Status>
-    <Background xmlns="71af3243-3dd4-4a8d-8c0d-dd76da1f02a5">false</Background>
-    <_ip_UnifiedCompliancePolicyProperties xmlns="http://schemas.microsoft.com/sharepoint/v3" xsi:nil="true"/>
-    <ImageTagsTaxHTField xmlns="71af3243-3dd4-4a8d-8c0d-dd76da1f02a5">
-      <Terms xmlns="http://schemas.microsoft.com/office/infopath/2007/PartnerControls"/>
-    </ImageTagsTaxHTField>
-    <TaxCatchAll xmlns="230e9df3-be65-4c73-a93b-d1236ebd677e" xsi:nil="true"/>
-    <MediaServiceKeyPoints xmlns="71af3243-3dd4-4a8d-8c0d-dd76da1f02a5" xsi:nil="true"/>
-  </documentManagement>
-</p:properties>
+<file path=customXml/itemProps1.xml><?xml version="1.0" encoding="utf-8"?>
+<ds:datastoreItem xmlns:ds="http://schemas.openxmlformats.org/officeDocument/2006/customXml" ds:itemID="{CABF691C-888B-4061-8A6F-D5CE84A0254B}">
+  <ds:schemaRefs>
+    <ds:schemaRef ds:uri="http://schemas.microsoft.com/sharepoint/v3/contenttype/forms"/>
+  </ds:schemaRefs>
+</ds:datastoreItem>
 </file>
 
-<file path=customXml/item3.xml><?xml version="1.0" encoding="utf-8"?>
-<?mso-contentType ?>
-<FormTemplates xmlns="http://schemas.microsoft.com/sharepoint/v3/contenttype/forms">
-  <Display>DocumentLibraryForm</Display>
-  <Edit>DocumentLibraryForm</Edit>
-  <New>DocumentLibraryForm</New>
-</FormTemplates>
+<file path=customXml/itemProps2.xml><?xml version="1.0" encoding="utf-8"?>
+<ds:datastoreItem xmlns:ds="http://schemas.openxmlformats.org/officeDocument/2006/customXml" ds:itemID="{49168DCE-134F-4610-A6AA-88CEBE8D71D2}">
+  <ds:schemaRefs>
+    <ds:schemaRef ds:uri="http://schemas.microsoft.com/office/2006/metadata/properties"/>
+    <ds:schemaRef ds:uri="http://schemas.microsoft.com/office/infopath/2007/PartnerControls"/>
+    <ds:schemaRef ds:uri="http://schemas.microsoft.com/sharepoint/v3"/>
+    <ds:schemaRef ds:uri="71af3243-3dd4-4a8d-8c0d-dd76da1f02a5"/>
+    <ds:schemaRef ds:uri="230e9df3-be65-4c73-a93b-d1236ebd677e"/>
+  </ds:schemaRefs>
+</ds:datastoreItem>
 </file>
 
-<file path=customXml/itemProps1.xml><?xml version="1.0" encoding="utf-8"?>
+<file path=customXml/itemProps3.xml><?xml version="1.0" encoding="utf-8"?>
 <ds:datastoreItem xmlns:ds="http://schemas.openxmlformats.org/officeDocument/2006/customXml" ds:itemID="{5EDE3176-A15D-46A3-BDDB-64A0D7363224}">
   <ds:schemaRefs>
     <ds:schemaRef ds:uri="http://schemas.microsoft.com/office/2006/metadata/contentType"/>
@@ -8240,26 +9647,6 @@
 </ds:datastoreItem>
 </file>
 
-<file path=customXml/itemProps2.xml><?xml version="1.0" encoding="utf-8"?>
-<ds:datastoreItem xmlns:ds="http://schemas.openxmlformats.org/officeDocument/2006/customXml" ds:itemID="{49168DCE-134F-4610-A6AA-88CEBE8D71D2}">
-  <ds:schemaRefs>
-    <ds:schemaRef ds:uri="http://schemas.microsoft.com/office/2006/metadata/properties"/>
-    <ds:schemaRef ds:uri="http://schemas.microsoft.com/office/infopath/2007/PartnerControls"/>
-    <ds:schemaRef ds:uri="http://schemas.microsoft.com/sharepoint/v3"/>
-    <ds:schemaRef ds:uri="71af3243-3dd4-4a8d-8c0d-dd76da1f02a5"/>
-    <ds:schemaRef ds:uri="230e9df3-be65-4c73-a93b-d1236ebd677e"/>
-  </ds:schemaRefs>
-</ds:datastoreItem>
-</file>
-
-<file path=customXml/itemProps3.xml><?xml version="1.0" encoding="utf-8"?>
-<ds:datastoreItem xmlns:ds="http://schemas.openxmlformats.org/officeDocument/2006/customXml" ds:itemID="{CABF691C-888B-4061-8A6F-D5CE84A0254B}">
-  <ds:schemaRefs>
-    <ds:schemaRef ds:uri="http://schemas.microsoft.com/sharepoint/v3/contenttype/forms"/>
-  </ds:schemaRefs>
-</ds:datastoreItem>
-</file>
-
 <file path=docMetadata/LabelInfo.xml><?xml version="1.0" encoding="utf-8"?>
 <clbl:labelList xmlns:clbl="http://schemas.microsoft.com/office/2020/mipLabelMetadata"/>
 </file>
</xml_diff>